<commit_message>
rfctr: isolate Slides.add_slide() to single test
Commenting out Slides.add_slide() to prepare for rework causes several
acceptance tests to fail. Early acceptance tests created test
presentations rather than opening stored test .pptx files. Update these
tests to remove any use of Slides.add_slide().
</commit_message>
<xml_diff>
--- a/features/steps/test_files/txt-text.pptx
+++ b/features/steps/test_files/txt-text.pptx
@@ -6,6 +6,7 @@
   </p:sldMasterIdLst>
   <p:sldIdLst>
     <p:sldId id="256" r:id="rId2"/>
+    <p:sldId id="257" r:id="rId3"/>
   </p:sldIdLst>
   <p:sldSz cx="9144000" cy="6858000" type="screen4x3"/>
   <p:notesSz cx="6858000" cy="9144000"/>
@@ -439,7 +440,7 @@
         <p:spPr>
           <a:xfrm>
             <a:off x="899592" y="1124744"/>
-            <a:ext cx="967896" cy="923330"/>
+            <a:ext cx="1226455" cy="1200329"/>
           </a:xfrm>
           <a:prstGeom prst="rect">
             <a:avLst/>
@@ -478,6 +479,15 @@
               <a:rPr lang="en-US" smtClean="0"/>
               <a:t>1</a:t>
             </a:fld>
+            <a:endParaRPr lang="en-US" dirty="0" smtClean="0"/>
+          </a:p>
+          <a:p>
+            <a:r>
+              <a:rPr lang="en-US" smtClean="0">
+                <a:hlinkClick r:id="rId2"/>
+              </a:rPr>
+              <a:t>yahoo.com</a:t>
+            </a:r>
             <a:endParaRPr lang="en-US" dirty="0"/>
           </a:p>
         </p:txBody>
@@ -486,6 +496,116 @@
     <p:extLst>
       <p:ext uri="{BB962C8B-B14F-4D97-AF65-F5344CB8AC3E}">
         <p14:creationId xmlns:p14="http://schemas.microsoft.com/office/powerpoint/2010/main" val="1506430799"/>
+      </p:ext>
+    </p:extLst>
+  </p:cSld>
+  <p:clrMapOvr>
+    <a:masterClrMapping/>
+  </p:clrMapOvr>
+</p:sld>
+</file>
+
+<file path=ppt/slides/slide2.xml><?xml version="1.0" encoding="utf-8"?>
+<p:sld xmlns:a="http://schemas.openxmlformats.org/drawingml/2006/main" xmlns:r="http://schemas.openxmlformats.org/officeDocument/2006/relationships" xmlns:p="http://schemas.openxmlformats.org/presentationml/2006/main">
+  <p:cSld>
+    <p:spTree>
+      <p:nvGrpSpPr>
+        <p:cNvPr id="1" name=""/>
+        <p:cNvGrpSpPr/>
+        <p:nvPr/>
+      </p:nvGrpSpPr>
+      <p:grpSpPr>
+        <a:xfrm>
+          <a:off x="0" y="0"/>
+          <a:ext cx="0" cy="0"/>
+          <a:chOff x="0" y="0"/>
+          <a:chExt cx="0" cy="0"/>
+        </a:xfrm>
+      </p:grpSpPr>
+      <p:graphicFrame>
+        <p:nvGraphicFramePr>
+          <p:cNvPr id="2" name="Table 1"/>
+          <p:cNvGraphicFramePr>
+            <a:graphicFrameLocks noGrp="1"/>
+          </p:cNvGraphicFramePr>
+          <p:nvPr>
+            <p:extLst>
+              <p:ext uri="{D42A27DB-BD31-4B8C-83A1-F6EECF244321}">
+                <p14:modId xmlns:p14="http://schemas.microsoft.com/office/powerpoint/2010/main" val="3994547037"/>
+              </p:ext>
+            </p:extLst>
+          </p:nvPr>
+        </p:nvGraphicFramePr>
+        <p:xfrm>
+          <a:off x="1524000" y="1397000"/>
+          <a:ext cx="6096000" cy="741680"/>
+        </p:xfrm>
+        <a:graphic>
+          <a:graphicData uri="http://schemas.openxmlformats.org/drawingml/2006/table">
+            <a:tbl>
+              <a:tblPr firstRow="1" bandRow="1">
+                <a:tableStyleId>{5C22544A-7EE6-4342-B048-85BDC9FD1C3A}</a:tableStyleId>
+              </a:tblPr>
+              <a:tblGrid>
+                <a:gridCol w="3048000"/>
+                <a:gridCol w="3048000"/>
+              </a:tblGrid>
+              <a:tr h="370840">
+                <a:tc>
+                  <a:txBody>
+                    <a:bodyPr/>
+                    <a:lstStyle/>
+                    <a:p>
+                      <a:r>
+                        <a:rPr lang="en-US" dirty="0" smtClean="0"/>
+                        <a:t>Text run in table cell</a:t>
+                      </a:r>
+                      <a:endParaRPr lang="en-US" dirty="0"/>
+                    </a:p>
+                  </a:txBody>
+                  <a:tcPr/>
+                </a:tc>
+                <a:tc>
+                  <a:txBody>
+                    <a:bodyPr/>
+                    <a:lstStyle/>
+                    <a:p>
+                      <a:endParaRPr lang="en-US"/>
+                    </a:p>
+                  </a:txBody>
+                  <a:tcPr/>
+                </a:tc>
+              </a:tr>
+              <a:tr h="370840">
+                <a:tc>
+                  <a:txBody>
+                    <a:bodyPr/>
+                    <a:lstStyle/>
+                    <a:p>
+                      <a:endParaRPr lang="en-US"/>
+                    </a:p>
+                  </a:txBody>
+                  <a:tcPr/>
+                </a:tc>
+                <a:tc>
+                  <a:txBody>
+                    <a:bodyPr/>
+                    <a:lstStyle/>
+                    <a:p>
+                      <a:endParaRPr lang="en-US" dirty="0"/>
+                    </a:p>
+                  </a:txBody>
+                  <a:tcPr/>
+                </a:tc>
+              </a:tr>
+            </a:tbl>
+          </a:graphicData>
+        </a:graphic>
+      </p:graphicFrame>
+    </p:spTree>
+    <p:extLst>
+      <p:ext uri="{BB962C8B-B14F-4D97-AF65-F5344CB8AC3E}">
+        <p14:creationId xmlns:p14="http://schemas.microsoft.com/office/powerpoint/2010/main" val="1499760946"/>
       </p:ext>
     </p:extLst>
   </p:cSld>

</xml_diff>

<commit_message>
rfctr: modernize target tests and code
Revise wording to be consistent with current conventions.

Segregate these updates from code changes so test logic changes are
apparent in those commits.
</commit_message>
<xml_diff>
--- a/features/steps/test_files/txt-text.pptx
+++ b/features/steps/test_files/txt-text.pptx
@@ -105,6 +105,22 @@
       </a:defRPr>
     </a:lvl9pPr>
   </p:defaultTextStyle>
+  <p:extLst>
+    <p:ext uri="{EFAFB233-063F-42B5-8137-9DF3F51BA10A}">
+      <p15:sldGuideLst xmlns:p15="http://schemas.microsoft.com/office/powerpoint/2012/main">
+        <p15:guide id="1" orient="horz" pos="2160">
+          <p15:clr>
+            <a:srgbClr val="A4A3A4"/>
+          </p15:clr>
+        </p15:guide>
+        <p15:guide id="2" pos="2880">
+          <p15:clr>
+            <a:srgbClr val="A4A3A4"/>
+          </p15:clr>
+        </p15:guide>
+      </p15:sldGuideLst>
+    </p:ext>
+  </p:extLst>
 </p:presentation>
 </file>
 
@@ -454,41 +470,97 @@
           <a:lstStyle/>
           <a:p>
             <a:r>
-              <a:rPr lang="en-US" dirty="0" smtClean="0"/>
+              <a:rPr lang="en-US" dirty="0"/>
               <a:t> Foo Bar </a:t>
             </a:r>
             <a:br>
-              <a:rPr lang="en-US" dirty="0" smtClean="0"/>
+              <a:rPr lang="en-US" dirty="0"/>
             </a:br>
             <a:r>
-              <a:rPr lang="en-US" dirty="0" smtClean="0"/>
+              <a:rPr lang="en-US" dirty="0"/>
               <a:t> </a:t>
             </a:r>
             <a:r>
-              <a:rPr lang="en-US" dirty="0" err="1" smtClean="0"/>
+              <a:rPr lang="en-US" dirty="0" err="1"/>
               <a:t>Baz</a:t>
             </a:r>
             <a:r>
-              <a:rPr lang="en-US" dirty="0" smtClean="0"/>
+              <a:rPr lang="en-US" dirty="0"/>
               <a:t> Zoo </a:t>
             </a:r>
             <a:br>
-              <a:rPr lang="en-US" dirty="0" smtClean="0"/>
+              <a:rPr lang="en-US" dirty="0"/>
             </a:br>
             <a:fld id="{4ACDC551-8A53-AE47-95A7-4A2F0C1FFF1B}" type="slidenum">
               <a:rPr lang="en-US" smtClean="0"/>
               <a:t>1</a:t>
             </a:fld>
-            <a:endParaRPr lang="en-US" dirty="0" smtClean="0"/>
+            <a:endParaRPr lang="en-US" dirty="0"/>
           </a:p>
           <a:p>
             <a:r>
-              <a:rPr lang="en-US" smtClean="0">
+              <a:rPr lang="en-US">
                 <a:hlinkClick r:id="rId2"/>
               </a:rPr>
               <a:t>yahoo.com</a:t>
             </a:r>
             <a:endParaRPr lang="en-US" dirty="0"/>
+          </a:p>
+        </p:txBody>
+      </p:sp>
+      <p:sp>
+        <p:nvSpPr>
+          <p:cNvPr id="3" name="TextBox 2">
+            <a:extLst>
+              <a:ext uri="{FF2B5EF4-FFF2-40B4-BE49-F238E27FC236}">
+                <a16:creationId xmlns:a16="http://schemas.microsoft.com/office/drawing/2014/main" id="{463239B3-87E0-7B48-9E36-0A93A1F0D186}"/>
+              </a:ext>
+            </a:extLst>
+          </p:cNvPr>
+          <p:cNvSpPr txBox="1"/>
+          <p:nvPr/>
+        </p:nvSpPr>
+        <p:spPr>
+          <a:xfrm>
+            <a:off x="3995936" y="1124744"/>
+            <a:ext cx="514885" cy="1200329"/>
+          </a:xfrm>
+          <a:prstGeom prst="rect">
+            <a:avLst/>
+          </a:prstGeom>
+          <a:noFill/>
+        </p:spPr>
+        <p:txBody>
+          <a:bodyPr wrap="none" rtlCol="0">
+            <a:spAutoFit/>
+          </a:bodyPr>
+          <a:lstStyle/>
+          <a:p>
+            <a:r>
+              <a:rPr lang="en-US" dirty="0" err="1"/>
+              <a:t>abc</a:t>
+            </a:r>
+            <a:endParaRPr lang="en-US" dirty="0"/>
+          </a:p>
+          <a:p>
+            <a:r>
+              <a:rPr lang="en-US" dirty="0"/>
+              <a:t>a</a:t>
+            </a:r>
+            <a:br>
+              <a:rPr lang="en-US" dirty="0"/>
+            </a:br>
+            <a:r>
+              <a:rPr lang="en-US" dirty="0"/>
+              <a:t>b</a:t>
+            </a:r>
+            <a:br>
+              <a:rPr lang="en-US" dirty="0"/>
+            </a:br>
+            <a:r>
+              <a:rPr lang="en-US" dirty="0"/>
+              <a:t>c</a:t>
+            </a:r>
           </a:p>
         </p:txBody>
       </p:sp>
@@ -547,8 +619,20 @@
                 <a:tableStyleId>{5C22544A-7EE6-4342-B048-85BDC9FD1C3A}</a:tableStyleId>
               </a:tblPr>
               <a:tblGrid>
-                <a:gridCol w="3048000"/>
-                <a:gridCol w="3048000"/>
+                <a:gridCol w="3048000">
+                  <a:extLst>
+                    <a:ext uri="{9D8B030D-6E8A-4147-A177-3AD203B41FA5}">
+                      <a16:colId xmlns:a16="http://schemas.microsoft.com/office/drawing/2014/main" val="20000"/>
+                    </a:ext>
+                  </a:extLst>
+                </a:gridCol>
+                <a:gridCol w="3048000">
+                  <a:extLst>
+                    <a:ext uri="{9D8B030D-6E8A-4147-A177-3AD203B41FA5}">
+                      <a16:colId xmlns:a16="http://schemas.microsoft.com/office/drawing/2014/main" val="20001"/>
+                    </a:ext>
+                  </a:extLst>
+                </a:gridCol>
               </a:tblGrid>
               <a:tr h="370840">
                 <a:tc>
@@ -557,10 +641,9 @@
                     <a:lstStyle/>
                     <a:p>
                       <a:r>
-                        <a:rPr lang="en-US" dirty="0" smtClean="0"/>
+                        <a:rPr lang="en-US" dirty="0"/>
                         <a:t>Text run in table cell</a:t>
                       </a:r>
-                      <a:endParaRPr lang="en-US" dirty="0"/>
                     </a:p>
                   </a:txBody>
                   <a:tcPr/>
@@ -575,6 +658,11 @@
                   </a:txBody>
                   <a:tcPr/>
                 </a:tc>
+                <a:extLst>
+                  <a:ext uri="{0D108BD9-81ED-4DB2-BD59-A6C34878D82A}">
+                    <a16:rowId xmlns:a16="http://schemas.microsoft.com/office/drawing/2014/main" val="10000"/>
+                  </a:ext>
+                </a:extLst>
               </a:tr>
               <a:tr h="370840">
                 <a:tc>
@@ -597,6 +685,11 @@
                   </a:txBody>
                   <a:tcPr/>
                 </a:tc>
+                <a:extLst>
+                  <a:ext uri="{0D108BD9-81ED-4DB2-BD59-A6C34878D82A}">
+                    <a16:rowId xmlns:a16="http://schemas.microsoft.com/office/drawing/2014/main" val="10001"/>
+                  </a:ext>
+                </a:extLst>
               </a:tr>
             </a:tbl>
           </a:graphicData>

</xml_diff>